<commit_message>
20181121 updated session 8 slide deck
</commit_message>
<xml_diff>
--- a/Slidedecks/CoderDojoKells_Autumn_Session8_241118.pptx
+++ b/Slidedecks/CoderDojoKells_Autumn_Session8_241118.pptx
@@ -2368,7 +2368,7 @@
         <p:spPr>
           <a:xfrm>
             <a:off x="478080" y="360"/>
-            <a:ext cx="224280" cy="6853680"/>
+            <a:ext cx="223920" cy="6853320"/>
           </a:xfrm>
           <a:prstGeom prst="rect">
             <a:avLst/>
@@ -2404,7 +2404,7 @@
         <p:spPr>
           <a:xfrm>
             <a:off x="8151840" y="1685520"/>
-            <a:ext cx="3270600" cy="4404240"/>
+            <a:ext cx="3270240" cy="4403880"/>
           </a:xfrm>
           <a:custGeom>
             <a:avLst/>
@@ -2459,8 +2459,8 @@
         </p:nvSpPr>
         <p:spPr>
           <a:xfrm flipH="1" flipV="1">
-            <a:off x="748440" y="740160"/>
-            <a:ext cx="3271320" cy="4404240"/>
+            <a:off x="748440" y="739440"/>
+            <a:ext cx="3270960" cy="4403880"/>
           </a:xfrm>
           <a:custGeom>
             <a:avLst/>
@@ -2716,7 +2716,7 @@
         <p:spPr>
           <a:xfrm>
             <a:off x="478080" y="360"/>
-            <a:ext cx="224280" cy="6853680"/>
+            <a:ext cx="223920" cy="6853320"/>
           </a:xfrm>
           <a:prstGeom prst="rect">
             <a:avLst/>
@@ -2943,7 +2943,7 @@
         <p:spPr>
           <a:xfrm>
             <a:off x="6552000" y="3240000"/>
-            <a:ext cx="3452040" cy="939600"/>
+            <a:ext cx="3451680" cy="939240"/>
           </a:xfrm>
           <a:prstGeom prst="rect">
             <a:avLst/>
@@ -3012,7 +3012,7 @@
         <p:spPr>
           <a:xfrm>
             <a:off x="2059920" y="1296000"/>
-            <a:ext cx="4199040" cy="4242960"/>
+            <a:ext cx="4198680" cy="4242600"/>
           </a:xfrm>
           <a:prstGeom prst="rect">
             <a:avLst/>
@@ -3080,7 +3080,7 @@
         <p:spPr>
           <a:xfrm>
             <a:off x="1542960" y="936000"/>
-            <a:ext cx="9688320" cy="938520"/>
+            <a:ext cx="9687960" cy="938160"/>
           </a:xfrm>
           <a:prstGeom prst="rect">
             <a:avLst/>
@@ -3127,7 +3127,7 @@
         <p:spPr>
           <a:xfrm>
             <a:off x="1296000" y="1983240"/>
-            <a:ext cx="10361880" cy="4278600"/>
+            <a:ext cx="10361520" cy="4278240"/>
           </a:xfrm>
           <a:prstGeom prst="rect">
             <a:avLst/>
@@ -3177,8 +3177,34 @@
                 <a:latin typeface="Franklin Gothic Book"/>
                 <a:ea typeface="DejaVu Sans"/>
               </a:rPr>
-              <a:t>- Download this image &amp; upload to a new Scratch project: </a:t>
-            </a:r>
+              <a:t>- Download this image &amp; upload to a new Scratch project: http://share.coderdojokells.com/ninja-challenges/santa.png or </a:t>
+            </a:r>
+            <a:endParaRPr/>
+          </a:p>
+          <a:p>
+            <a:pPr>
+              <a:lnSpc>
+                <a:spcPct val="100000"/>
+              </a:lnSpc>
+            </a:pPr>
+            <a:r>
+              <a:rPr lang="en-GB" sz="2600" strike="noStrike">
+                <a:solidFill>
+                  <a:srgbClr val="000000"/>
+                </a:solidFill>
+                <a:latin typeface="Arial"/>
+                <a:ea typeface="DejaVu Sans"/>
+              </a:rPr>
+              <a:t>http://bit.ly/cdk-Santa </a:t>
+            </a:r>
+            <a:endParaRPr/>
+          </a:p>
+          <a:p>
+            <a:pPr>
+              <a:lnSpc>
+                <a:spcPct val="100000"/>
+              </a:lnSpc>
+            </a:pPr>
             <a:r>
               <a:rPr lang="en-GB" sz="2600" strike="noStrike">
                 <a:solidFill>
@@ -3187,8 +3213,16 @@
                 <a:latin typeface="Franklin Gothic Book"/>
                 <a:ea typeface="DejaVu Sans"/>
               </a:rPr>
-              <a:t>http://share.coderdojokells.com/ninja-challenges/santa.png</a:t>
-            </a:r>
+              <a:t>Step 2: </a:t>
+            </a:r>
+            <a:endParaRPr/>
+          </a:p>
+          <a:p>
+            <a:pPr>
+              <a:lnSpc>
+                <a:spcPct val="100000"/>
+              </a:lnSpc>
+            </a:pPr>
             <a:r>
               <a:rPr lang="en-GB" sz="2600" strike="noStrike">
                 <a:solidFill>
@@ -3197,7 +3231,7 @@
                 <a:latin typeface="Franklin Gothic Book"/>
                 <a:ea typeface="DejaVu Sans"/>
               </a:rPr>
-              <a:t> or </a:t>
+              <a:t>- Select the Gift sprite from the Scratch library and copy the code provided. </a:t>
             </a:r>
             <a:endParaRPr/>
           </a:p>
@@ -3207,26 +3241,6 @@
                 <a:spcPct val="100000"/>
               </a:lnSpc>
             </a:pPr>
-            <a:r>
-              <a:rPr lang="en-GB" sz="2600" strike="noStrike">
-                <a:solidFill>
-                  <a:srgbClr val="000000"/>
-                </a:solidFill>
-                <a:latin typeface="Arial"/>
-                <a:ea typeface="DejaVu Sans"/>
-              </a:rPr>
-              <a:t>http://bit.ly/cdk-Santa</a:t>
-            </a:r>
-            <a:r>
-              <a:rPr lang="en-GB" sz="2600" strike="noStrike">
-                <a:solidFill>
-                  <a:srgbClr val="000000"/>
-                </a:solidFill>
-                <a:latin typeface="Arial"/>
-                <a:ea typeface="DejaVu Sans"/>
-              </a:rPr>
-              <a:t> </a:t>
-            </a:r>
             <a:endParaRPr/>
           </a:p>
           <a:p>
@@ -3243,7 +3257,7 @@
                 <a:latin typeface="Franklin Gothic Book"/>
                 <a:ea typeface="DejaVu Sans"/>
               </a:rPr>
-              <a:t>Step 2: </a:t>
+              <a:t>Step 3: </a:t>
             </a:r>
             <a:endParaRPr/>
           </a:p>
@@ -3261,61 +3275,7 @@
                 <a:latin typeface="Franklin Gothic Book"/>
                 <a:ea typeface="DejaVu Sans"/>
               </a:rPr>
-              <a:t>- Select the Gift sprite from the Scratch library and copy the code provided. </a:t>
-            </a:r>
-            <a:endParaRPr/>
-          </a:p>
-          <a:p>
-            <a:pPr>
-              <a:lnSpc>
-                <a:spcPct val="100000"/>
-              </a:lnSpc>
-            </a:pPr>
-            <a:endParaRPr/>
-          </a:p>
-          <a:p>
-            <a:pPr>
-              <a:lnSpc>
-                <a:spcPct val="100000"/>
-              </a:lnSpc>
-            </a:pPr>
-            <a:r>
-              <a:rPr lang="en-GB" sz="2600" strike="noStrike">
-                <a:solidFill>
-                  <a:srgbClr val="191b0e"/>
-                </a:solidFill>
-                <a:latin typeface="Franklin Gothic Book"/>
-                <a:ea typeface="DejaVu Sans"/>
-              </a:rPr>
-              <a:t>Step 3: </a:t>
-            </a:r>
-            <a:endParaRPr/>
-          </a:p>
-          <a:p>
-            <a:pPr>
-              <a:lnSpc>
-                <a:spcPct val="100000"/>
-              </a:lnSpc>
-            </a:pPr>
-            <a:r>
-              <a:rPr lang="en-GB" sz="2600" strike="noStrike">
-                <a:solidFill>
-                  <a:srgbClr val="191b0e"/>
-                </a:solidFill>
-                <a:latin typeface="Franklin Gothic Book"/>
-                <a:ea typeface="DejaVu Sans"/>
-              </a:rPr>
-              <a:t>- Add code to generate a random winning number, reset scoreboard,</a:t>
-            </a:r>
-            <a:r>
-              <a:rPr lang="en-GB" sz="2600" strike="noStrike">
-                <a:solidFill>
-                  <a:srgbClr val="191b0e"/>
-                </a:solidFill>
-                <a:latin typeface="Franklin Gothic Book"/>
-                <a:ea typeface="DejaVu Sans"/>
-              </a:rPr>
-              <a:t> accept the player's guess, check the player's guess is correct, and tell player if they win or lose. </a:t>
+              <a:t>- Add code to generate a random winning number, reset scoreboard, accept the player's guess, check the player's guess is correct, and tell player if they win or lose. </a:t>
             </a:r>
             <a:endParaRPr/>
           </a:p>
@@ -3354,7 +3314,7 @@
 </file>
 
 <file path=ppt/slides/slide11.xml><?xml version="1.0" encoding="utf-8"?>
-<p:sld xmlns:a="http://schemas.openxmlformats.org/drawingml/2006/main" xmlns:p="http://schemas.openxmlformats.org/presentationml/2006/main" xmlns:r="http://schemas.openxmlformats.org/officeDocument/2006/relationships">
+<p:sld xmlns:a="http://schemas.openxmlformats.org/drawingml/2006/main" xmlns:p="http://schemas.openxmlformats.org/presentationml/2006/main" xmlns:r="http://schemas.openxmlformats.org/officeDocument/2006/relationships" show="0">
   <p:cSld>
     <p:spTree>
       <p:nvGrpSpPr>
@@ -3379,7 +3339,7 @@
         <p:spPr>
           <a:xfrm>
             <a:off x="1371600" y="685800"/>
-            <a:ext cx="9596880" cy="1481760"/>
+            <a:ext cx="9596520" cy="1481400"/>
           </a:xfrm>
           <a:prstGeom prst="rect">
             <a:avLst/>
@@ -3426,7 +3386,7 @@
         <p:spPr>
           <a:xfrm>
             <a:off x="4150800" y="905400"/>
-            <a:ext cx="820440" cy="238680"/>
+            <a:ext cx="820080" cy="238320"/>
           </a:xfrm>
           <a:prstGeom prst="rect">
             <a:avLst/>
@@ -3522,7 +3482,7 @@
         <p:spPr>
           <a:xfrm>
             <a:off x="1371600" y="685800"/>
-            <a:ext cx="9596880" cy="1481760"/>
+            <a:ext cx="9596520" cy="1481400"/>
           </a:xfrm>
           <a:prstGeom prst="rect">
             <a:avLst/>
@@ -3569,7 +3529,7 @@
         <p:spPr>
           <a:xfrm>
             <a:off x="4150800" y="905400"/>
-            <a:ext cx="820440" cy="390240"/>
+            <a:ext cx="820080" cy="389880"/>
           </a:xfrm>
           <a:prstGeom prst="rect">
             <a:avLst/>
@@ -3620,7 +3580,7 @@
         <p:spPr>
           <a:xfrm>
             <a:off x="1482840" y="1581480"/>
-            <a:ext cx="7301160" cy="4898520"/>
+            <a:ext cx="7300800" cy="4898160"/>
           </a:xfrm>
           <a:prstGeom prst="rect">
             <a:avLst/>
@@ -3663,7 +3623,7 @@
 </file>
 
 <file path=ppt/slides/slide13.xml><?xml version="1.0" encoding="utf-8"?>
-<p:sld xmlns:a="http://schemas.openxmlformats.org/drawingml/2006/main" xmlns:p="http://schemas.openxmlformats.org/presentationml/2006/main" xmlns:r="http://schemas.openxmlformats.org/officeDocument/2006/relationships">
+<p:sld xmlns:a="http://schemas.openxmlformats.org/drawingml/2006/main" xmlns:p="http://schemas.openxmlformats.org/presentationml/2006/main" xmlns:r="http://schemas.openxmlformats.org/officeDocument/2006/relationships" show="0">
   <p:cSld>
     <p:spTree>
       <p:nvGrpSpPr>
@@ -3688,7 +3648,7 @@
         <p:spPr>
           <a:xfrm>
             <a:off x="1371600" y="685800"/>
-            <a:ext cx="9596880" cy="1481760"/>
+            <a:ext cx="9596520" cy="1481400"/>
           </a:xfrm>
           <a:prstGeom prst="rect">
             <a:avLst/>
@@ -3784,7 +3744,7 @@
         <p:spPr>
           <a:xfrm>
             <a:off x="1456560" y="648000"/>
-            <a:ext cx="6246000" cy="867240"/>
+            <a:ext cx="6245640" cy="866880"/>
           </a:xfrm>
           <a:prstGeom prst="rect">
             <a:avLst/>
@@ -3835,7 +3795,7 @@
         <p:spPr>
           <a:xfrm>
             <a:off x="1584000" y="1368000"/>
-            <a:ext cx="6408000" cy="5256000"/>
+            <a:ext cx="6407640" cy="5255640"/>
           </a:xfrm>
           <a:prstGeom prst="rect">
             <a:avLst/>
@@ -3896,14 +3856,14 @@
       </p:grpSpPr>
       <p:sp>
         <p:nvSpPr>
-          <p:cNvPr id="104" name="TextShape 1"/>
-          <p:cNvSpPr txBox="1"/>
+          <p:cNvPr id="104" name="CustomShape 1"/>
+          <p:cNvSpPr/>
           <p:nvPr/>
         </p:nvSpPr>
         <p:spPr>
           <a:xfrm>
             <a:off x="1461960" y="715320"/>
-            <a:ext cx="10058040" cy="1228680"/>
+            <a:ext cx="10057680" cy="1228320"/>
           </a:xfrm>
           <a:prstGeom prst="rect">
             <a:avLst/>
@@ -3913,6 +3873,12 @@
             <a:noFill/>
           </a:ln>
         </p:spPr>
+        <p:style>
+          <a:lnRef idx="0"/>
+          <a:fillRef idx="0"/>
+          <a:effectRef idx="0"/>
+          <a:fontRef idx="minor"/>
+        </p:style>
         <p:txBody>
           <a:bodyPr lIns="90000" rIns="90000" tIns="45000" bIns="45000"/>
           <a:p>
@@ -3948,7 +3914,7 @@
         <p:spPr>
           <a:xfrm>
             <a:off x="3292920" y="3292920"/>
-            <a:ext cx="2539080" cy="2539080"/>
+            <a:ext cx="2538720" cy="2538720"/>
           </a:xfrm>
           <a:prstGeom prst="rect">
             <a:avLst/>
@@ -3971,7 +3937,7 @@
         <p:spPr>
           <a:xfrm>
             <a:off x="6915960" y="1869840"/>
-            <a:ext cx="3020040" cy="3962160"/>
+            <a:ext cx="3019680" cy="3961800"/>
           </a:xfrm>
           <a:prstGeom prst="rect">
             <a:avLst/>
@@ -4039,7 +4005,7 @@
         <p:spPr>
           <a:xfrm>
             <a:off x="1371600" y="685800"/>
-            <a:ext cx="9596880" cy="1481760"/>
+            <a:ext cx="9596520" cy="1481400"/>
           </a:xfrm>
           <a:prstGeom prst="rect">
             <a:avLst/>
@@ -4086,7 +4052,7 @@
         <p:spPr>
           <a:xfrm>
             <a:off x="1371600" y="2286000"/>
-            <a:ext cx="9596880" cy="3576960"/>
+            <a:ext cx="9596520" cy="3576600"/>
           </a:xfrm>
           <a:prstGeom prst="rect">
             <a:avLst/>
@@ -4304,7 +4270,7 @@
         <p:spPr>
           <a:xfrm>
             <a:off x="1371600" y="685800"/>
-            <a:ext cx="9596880" cy="1481760"/>
+            <a:ext cx="9596520" cy="1481400"/>
           </a:xfrm>
           <a:prstGeom prst="rect">
             <a:avLst/>
@@ -4351,7 +4317,7 @@
         <p:spPr>
           <a:xfrm>
             <a:off x="1371600" y="2286000"/>
-            <a:ext cx="9596880" cy="3576960"/>
+            <a:ext cx="9596520" cy="3576600"/>
           </a:xfrm>
           <a:prstGeom prst="rect">
             <a:avLst/>
@@ -4589,7 +4555,7 @@
         <p:spPr>
           <a:xfrm>
             <a:off x="1371600" y="685800"/>
-            <a:ext cx="9596880" cy="1481760"/>
+            <a:ext cx="9596520" cy="1481400"/>
           </a:xfrm>
           <a:prstGeom prst="rect">
             <a:avLst/>
@@ -4636,7 +4602,7 @@
         <p:spPr>
           <a:xfrm>
             <a:off x="1347120" y="1820880"/>
-            <a:ext cx="9596880" cy="4227120"/>
+            <a:ext cx="9596520" cy="4226760"/>
           </a:xfrm>
           <a:prstGeom prst="rect">
             <a:avLst/>
@@ -4751,7 +4717,7 @@
               </a:lnSpc>
               <a:buSzPct val="45000"/>
               <a:buFont typeface="StarSymbol"/>
-              <a:buChar char=""/>
+              <a:buChar char="l"/>
             </a:pPr>
             <a:r>
               <a:rPr lang="en-GB" sz="5400" strike="noStrike">
@@ -4863,7 +4829,7 @@
         <p:spPr>
           <a:xfrm>
             <a:off x="1371600" y="685800"/>
-            <a:ext cx="9596880" cy="1481760"/>
+            <a:ext cx="9596520" cy="1481400"/>
           </a:xfrm>
           <a:prstGeom prst="rect">
             <a:avLst/>
@@ -4910,7 +4876,7 @@
         <p:spPr>
           <a:xfrm>
             <a:off x="1306080" y="1584000"/>
-            <a:ext cx="7113960" cy="4961520"/>
+            <a:ext cx="7113600" cy="4961160"/>
           </a:xfrm>
           <a:prstGeom prst="rect">
             <a:avLst/>
@@ -5068,7 +5034,7 @@
         <p:spPr>
           <a:xfrm>
             <a:off x="1371600" y="685800"/>
-            <a:ext cx="9596880" cy="1481760"/>
+            <a:ext cx="9596520" cy="1481400"/>
           </a:xfrm>
           <a:prstGeom prst="rect">
             <a:avLst/>
@@ -5115,7 +5081,7 @@
         <p:spPr>
           <a:xfrm>
             <a:off x="1493280" y="1574280"/>
-            <a:ext cx="6986880" cy="635040"/>
+            <a:ext cx="6986520" cy="634680"/>
           </a:xfrm>
           <a:prstGeom prst="rect">
             <a:avLst/>
@@ -5213,7 +5179,7 @@
         <p:spPr>
           <a:xfrm>
             <a:off x="1371600" y="685800"/>
-            <a:ext cx="9596880" cy="1481760"/>
+            <a:ext cx="9596520" cy="1481400"/>
           </a:xfrm>
           <a:prstGeom prst="rect">
             <a:avLst/>
@@ -5260,7 +5226,7 @@
         <p:spPr>
           <a:xfrm>
             <a:off x="3738240" y="923400"/>
-            <a:ext cx="820440" cy="238680"/>
+            <a:ext cx="820080" cy="238320"/>
           </a:xfrm>
           <a:prstGeom prst="rect">
             <a:avLst/>
@@ -5356,7 +5322,7 @@
         <p:spPr>
           <a:xfrm>
             <a:off x="1371600" y="685800"/>
-            <a:ext cx="9596880" cy="1481760"/>
+            <a:ext cx="9596520" cy="1481400"/>
           </a:xfrm>
           <a:prstGeom prst="rect">
             <a:avLst/>
@@ -5403,7 +5369,7 @@
         <p:spPr>
           <a:xfrm>
             <a:off x="5190480" y="923400"/>
-            <a:ext cx="820440" cy="238680"/>
+            <a:ext cx="820080" cy="238320"/>
           </a:xfrm>
           <a:prstGeom prst="rect">
             <a:avLst/>
@@ -5499,7 +5465,7 @@
         <p:spPr>
           <a:xfrm>
             <a:off x="1512000" y="1003320"/>
-            <a:ext cx="9577080" cy="723960"/>
+            <a:ext cx="9576720" cy="723600"/>
           </a:xfrm>
           <a:prstGeom prst="rect">
             <a:avLst/>
@@ -5546,7 +5512,7 @@
         <p:spPr>
           <a:xfrm>
             <a:off x="759600" y="2141280"/>
-            <a:ext cx="11335680" cy="4266000"/>
+            <a:ext cx="11335320" cy="4265640"/>
           </a:xfrm>
           <a:prstGeom prst="rect">
             <a:avLst/>
@@ -5598,6 +5564,9 @@
             </a:pPr>
             <a:r>
               <a:rPr lang="en-GB" sz="3600" strike="noStrike">
+                <a:solidFill>
+                  <a:srgbClr val="000000"/>
+                </a:solidFill>
                 <a:latin typeface="Franklin Gothic Book"/>
                 <a:ea typeface="DejaVu Sans"/>
               </a:rPr>

</xml_diff>